<commit_message>
Update TDS overview slides for workshop.
</commit_message>
<xml_diff>
--- a/docs/website/tds/tutorial/TDSOverview.pptx
+++ b/docs/website/tds/tutorial/TDSOverview.pptx
@@ -5,7 +5,7 @@
     <p:sldMasterId id="2147483648" r:id="rId1"/>
   </p:sldMasterIdLst>
   <p:notesMasterIdLst>
-    <p:notesMasterId r:id="rId20"/>
+    <p:notesMasterId r:id="rId21"/>
   </p:notesMasterIdLst>
   <p:sldIdLst>
     <p:sldId id="256" r:id="rId2"/>
@@ -26,6 +26,7 @@
     <p:sldId id="319" r:id="rId17"/>
     <p:sldId id="326" r:id="rId18"/>
     <p:sldId id="314" r:id="rId19"/>
+    <p:sldId id="340" r:id="rId20"/>
   </p:sldIdLst>
   <p:sldSz cx="9144000" cy="6858000" type="screen4x3"/>
   <p:notesSz cx="6858000" cy="9144000"/>
@@ -263,7 +264,7 @@
             <a:fld id="{F4E7C0C8-AB78-4D95-8D71-EB2AB099FAD8}" type="datetimeFigureOut">
               <a:rPr lang="en-US" altLang="en-US"/>
               <a:pPr/>
-              <a:t>10/20/2014</a:t>
+              <a:t>7/22/2015</a:t>
             </a:fld>
             <a:endParaRPr lang="en-US" altLang="en-US"/>
           </a:p>
@@ -1061,6 +1062,264 @@
 </p:notes>
 </file>
 
+<file path=ppt/notesSlides/notesSlide4.xml><?xml version="1.0" encoding="utf-8"?>
+<p:notes xmlns:a="http://schemas.openxmlformats.org/drawingml/2006/main" xmlns:r="http://schemas.openxmlformats.org/officeDocument/2006/relationships" xmlns:p="http://schemas.openxmlformats.org/presentationml/2006/main">
+  <p:cSld>
+    <p:spTree>
+      <p:nvGrpSpPr>
+        <p:cNvPr id="1" name=""/>
+        <p:cNvGrpSpPr/>
+        <p:nvPr/>
+      </p:nvGrpSpPr>
+      <p:grpSpPr>
+        <a:xfrm>
+          <a:off x="0" y="0"/>
+          <a:ext cx="0" cy="0"/>
+          <a:chOff x="0" y="0"/>
+          <a:chExt cx="0" cy="0"/>
+        </a:xfrm>
+      </p:grpSpPr>
+      <p:sp>
+        <p:nvSpPr>
+          <p:cNvPr id="39937" name="Slide Image Placeholder 1"/>
+          <p:cNvSpPr>
+            <a:spLocks noGrp="1" noRot="1" noChangeAspect="1"/>
+          </p:cNvSpPr>
+          <p:nvPr>
+            <p:ph type="sldImg"/>
+          </p:nvPr>
+        </p:nvSpPr>
+        <p:spPr bwMode="auto">
+          <a:noFill/>
+          <a:ln>
+            <a:solidFill>
+              <a:srgbClr val="000000"/>
+            </a:solidFill>
+            <a:miter lim="800000"/>
+            <a:headEnd/>
+            <a:tailEnd/>
+          </a:ln>
+          <a:extLst>
+            <a:ext uri="{909E8E84-426E-40DD-AFC4-6F175D3DCCD1}">
+              <a14:hiddenFill xmlns:a14="http://schemas.microsoft.com/office/drawing/2010/main">
+                <a:solidFill>
+                  <a:srgbClr val="FFFFFF"/>
+                </a:solidFill>
+              </a14:hiddenFill>
+            </a:ext>
+          </a:extLst>
+        </p:spPr>
+      </p:sp>
+      <p:sp>
+        <p:nvSpPr>
+          <p:cNvPr id="39938" name="Notes Placeholder 2"/>
+          <p:cNvSpPr>
+            <a:spLocks noGrp="1"/>
+          </p:cNvSpPr>
+          <p:nvPr>
+            <p:ph type="body" idx="1"/>
+          </p:nvPr>
+        </p:nvSpPr>
+        <p:spPr bwMode="auto">
+          <a:noFill/>
+          <a:extLst>
+            <a:ext uri="{909E8E84-426E-40DD-AFC4-6F175D3DCCD1}">
+              <a14:hiddenFill xmlns:a14="http://schemas.microsoft.com/office/drawing/2010/main">
+                <a:solidFill>
+                  <a:srgbClr val="FFFFFF"/>
+                </a:solidFill>
+              </a14:hiddenFill>
+            </a:ext>
+            <a:ext uri="{91240B29-F687-4F45-9708-019B960494DF}">
+              <a14:hiddenLine xmlns:a14="http://schemas.microsoft.com/office/drawing/2010/main" w="9525">
+                <a:solidFill>
+                  <a:srgbClr val="000000"/>
+                </a:solidFill>
+                <a:miter lim="800000"/>
+                <a:headEnd/>
+                <a:tailEnd/>
+              </a14:hiddenLine>
+            </a:ext>
+          </a:extLst>
+        </p:spPr>
+        <p:txBody>
+          <a:bodyPr wrap="square" numCol="1" anchor="t" anchorCtr="0" compatLnSpc="1">
+            <a:prstTxWarp prst="textNoShape">
+              <a:avLst/>
+            </a:prstTxWarp>
+          </a:bodyPr>
+          <a:lstStyle/>
+          <a:p>
+            <a:endParaRPr lang="en-US" altLang="en-US" smtClean="0">
+              <a:ea typeface="ＭＳ Ｐゴシック" pitchFamily="34" charset="-128"/>
+            </a:endParaRPr>
+          </a:p>
+        </p:txBody>
+      </p:sp>
+      <p:sp>
+        <p:nvSpPr>
+          <p:cNvPr id="39939" name="Slide Number Placeholder 3"/>
+          <p:cNvSpPr>
+            <a:spLocks noGrp="1"/>
+          </p:cNvSpPr>
+          <p:nvPr>
+            <p:ph type="sldNum" sz="quarter" idx="5"/>
+          </p:nvPr>
+        </p:nvSpPr>
+        <p:spPr bwMode="auto">
+          <a:noFill/>
+          <a:extLst>
+            <a:ext uri="{909E8E84-426E-40DD-AFC4-6F175D3DCCD1}">
+              <a14:hiddenFill xmlns:a14="http://schemas.microsoft.com/office/drawing/2010/main">
+                <a:solidFill>
+                  <a:srgbClr val="FFFFFF"/>
+                </a:solidFill>
+              </a14:hiddenFill>
+            </a:ext>
+            <a:ext uri="{91240B29-F687-4F45-9708-019B960494DF}">
+              <a14:hiddenLine xmlns:a14="http://schemas.microsoft.com/office/drawing/2010/main" w="9525">
+                <a:solidFill>
+                  <a:srgbClr val="000000"/>
+                </a:solidFill>
+                <a:miter lim="800000"/>
+                <a:headEnd/>
+                <a:tailEnd/>
+              </a14:hiddenLine>
+            </a:ext>
+          </a:extLst>
+        </p:spPr>
+        <p:txBody>
+          <a:bodyPr/>
+          <a:lstStyle>
+            <a:lvl1pPr eaLnBrk="0" hangingPunct="0">
+              <a:defRPr sz="2400">
+                <a:solidFill>
+                  <a:schemeClr val="tx1"/>
+                </a:solidFill>
+                <a:latin typeface="Arial" pitchFamily="34" charset="0"/>
+                <a:ea typeface="ＭＳ Ｐゴシック" pitchFamily="34" charset="-128"/>
+              </a:defRPr>
+            </a:lvl1pPr>
+            <a:lvl2pPr marL="742950" indent="-285750" eaLnBrk="0" hangingPunct="0">
+              <a:defRPr sz="2400">
+                <a:solidFill>
+                  <a:schemeClr val="tx1"/>
+                </a:solidFill>
+                <a:latin typeface="Arial" pitchFamily="34" charset="0"/>
+                <a:ea typeface="ＭＳ Ｐゴシック" pitchFamily="34" charset="-128"/>
+              </a:defRPr>
+            </a:lvl2pPr>
+            <a:lvl3pPr marL="1143000" indent="-228600" eaLnBrk="0" hangingPunct="0">
+              <a:defRPr sz="2400">
+                <a:solidFill>
+                  <a:schemeClr val="tx1"/>
+                </a:solidFill>
+                <a:latin typeface="Arial" pitchFamily="34" charset="0"/>
+                <a:ea typeface="ＭＳ Ｐゴシック" pitchFamily="34" charset="-128"/>
+              </a:defRPr>
+            </a:lvl3pPr>
+            <a:lvl4pPr marL="1600200" indent="-228600" eaLnBrk="0" hangingPunct="0">
+              <a:defRPr sz="2400">
+                <a:solidFill>
+                  <a:schemeClr val="tx1"/>
+                </a:solidFill>
+                <a:latin typeface="Arial" pitchFamily="34" charset="0"/>
+                <a:ea typeface="ＭＳ Ｐゴシック" pitchFamily="34" charset="-128"/>
+              </a:defRPr>
+            </a:lvl4pPr>
+            <a:lvl5pPr marL="2057400" indent="-228600" eaLnBrk="0" hangingPunct="0">
+              <a:defRPr sz="2400">
+                <a:solidFill>
+                  <a:schemeClr val="tx1"/>
+                </a:solidFill>
+                <a:latin typeface="Arial" pitchFamily="34" charset="0"/>
+                <a:ea typeface="ＭＳ Ｐゴシック" pitchFamily="34" charset="-128"/>
+              </a:defRPr>
+            </a:lvl5pPr>
+            <a:lvl6pPr marL="2514600" indent="-228600" eaLnBrk="0" fontAlgn="base" hangingPunct="0">
+              <a:spcBef>
+                <a:spcPct val="0"/>
+              </a:spcBef>
+              <a:spcAft>
+                <a:spcPct val="0"/>
+              </a:spcAft>
+              <a:defRPr sz="2400">
+                <a:solidFill>
+                  <a:schemeClr val="tx1"/>
+                </a:solidFill>
+                <a:latin typeface="Arial" pitchFamily="34" charset="0"/>
+                <a:ea typeface="ＭＳ Ｐゴシック" pitchFamily="34" charset="-128"/>
+              </a:defRPr>
+            </a:lvl6pPr>
+            <a:lvl7pPr marL="2971800" indent="-228600" eaLnBrk="0" fontAlgn="base" hangingPunct="0">
+              <a:spcBef>
+                <a:spcPct val="0"/>
+              </a:spcBef>
+              <a:spcAft>
+                <a:spcPct val="0"/>
+              </a:spcAft>
+              <a:defRPr sz="2400">
+                <a:solidFill>
+                  <a:schemeClr val="tx1"/>
+                </a:solidFill>
+                <a:latin typeface="Arial" pitchFamily="34" charset="0"/>
+                <a:ea typeface="ＭＳ Ｐゴシック" pitchFamily="34" charset="-128"/>
+              </a:defRPr>
+            </a:lvl7pPr>
+            <a:lvl8pPr marL="3429000" indent="-228600" eaLnBrk="0" fontAlgn="base" hangingPunct="0">
+              <a:spcBef>
+                <a:spcPct val="0"/>
+              </a:spcBef>
+              <a:spcAft>
+                <a:spcPct val="0"/>
+              </a:spcAft>
+              <a:defRPr sz="2400">
+                <a:solidFill>
+                  <a:schemeClr val="tx1"/>
+                </a:solidFill>
+                <a:latin typeface="Arial" pitchFamily="34" charset="0"/>
+                <a:ea typeface="ＭＳ Ｐゴシック" pitchFamily="34" charset="-128"/>
+              </a:defRPr>
+            </a:lvl8pPr>
+            <a:lvl9pPr marL="3886200" indent="-228600" eaLnBrk="0" fontAlgn="base" hangingPunct="0">
+              <a:spcBef>
+                <a:spcPct val="0"/>
+              </a:spcBef>
+              <a:spcAft>
+                <a:spcPct val="0"/>
+              </a:spcAft>
+              <a:defRPr sz="2400">
+                <a:solidFill>
+                  <a:schemeClr val="tx1"/>
+                </a:solidFill>
+                <a:latin typeface="Arial" pitchFamily="34" charset="0"/>
+                <a:ea typeface="ＭＳ Ｐゴシック" pitchFamily="34" charset="-128"/>
+              </a:defRPr>
+            </a:lvl9pPr>
+          </a:lstStyle>
+          <a:p>
+            <a:pPr eaLnBrk="1" hangingPunct="1"/>
+            <a:fld id="{83D0C151-6C72-4F08-A118-6EC5C147D161}" type="slidenum">
+              <a:rPr lang="en-US" altLang="en-US" sz="1200">
+                <a:latin typeface="Calibri" pitchFamily="34" charset="0"/>
+              </a:rPr>
+              <a:pPr eaLnBrk="1" hangingPunct="1"/>
+              <a:t>19</a:t>
+            </a:fld>
+            <a:endParaRPr lang="en-US" altLang="en-US" sz="1200">
+              <a:latin typeface="Calibri" pitchFamily="34" charset="0"/>
+            </a:endParaRPr>
+          </a:p>
+        </p:txBody>
+      </p:sp>
+    </p:spTree>
+  </p:cSld>
+  <p:clrMapOvr>
+    <a:masterClrMapping/>
+  </p:clrMapOvr>
+</p:notes>
+</file>
+
 <file path=ppt/slideLayouts/slideLayout1.xml><?xml version="1.0" encoding="utf-8"?>
 <p:sldLayout xmlns:a="http://schemas.openxmlformats.org/drawingml/2006/main" xmlns:r="http://schemas.openxmlformats.org/officeDocument/2006/relationships" xmlns:p="http://schemas.openxmlformats.org/presentationml/2006/main" type="title" preserve="1">
   <p:cSld name="Title Slide">
@@ -1247,7 +1506,7 @@
             <a:fld id="{CA232C29-40D8-4D69-B2D4-B48CA89F4B98}" type="datetimeFigureOut">
               <a:rPr lang="en-US" altLang="en-US"/>
               <a:pPr/>
-              <a:t>10/20/2014</a:t>
+              <a:t>7/22/2015</a:t>
             </a:fld>
             <a:endParaRPr lang="en-US" altLang="en-US"/>
           </a:p>
@@ -1434,7 +1693,7 @@
             <a:fld id="{E8EC2AEB-81E4-4D11-B984-7BB55A7032D6}" type="datetimeFigureOut">
               <a:rPr lang="en-US" altLang="en-US"/>
               <a:pPr/>
-              <a:t>10/20/2014</a:t>
+              <a:t>7/22/2015</a:t>
             </a:fld>
             <a:endParaRPr lang="en-US" altLang="en-US"/>
           </a:p>
@@ -1631,7 +1890,7 @@
             <a:fld id="{10645CB1-BD3C-4A1F-A9B4-BE3C4E3AD284}" type="datetimeFigureOut">
               <a:rPr lang="en-US" altLang="en-US"/>
               <a:pPr/>
-              <a:t>10/20/2014</a:t>
+              <a:t>7/22/2015</a:t>
             </a:fld>
             <a:endParaRPr lang="en-US" altLang="en-US"/>
           </a:p>
@@ -1818,7 +2077,7 @@
             <a:fld id="{429AF7DF-ED1B-4255-BFC9-F77D6F6FBEAA}" type="datetimeFigureOut">
               <a:rPr lang="en-US" altLang="en-US"/>
               <a:pPr/>
-              <a:t>10/20/2014</a:t>
+              <a:t>7/22/2015</a:t>
             </a:fld>
             <a:endParaRPr lang="en-US" altLang="en-US"/>
           </a:p>
@@ -2081,7 +2340,7 @@
             <a:fld id="{413C1095-590C-4155-B738-5D33FDF0D281}" type="datetimeFigureOut">
               <a:rPr lang="en-US" altLang="en-US"/>
               <a:pPr/>
-              <a:t>10/20/2014</a:t>
+              <a:t>7/22/2015</a:t>
             </a:fld>
             <a:endParaRPr lang="en-US" altLang="en-US"/>
           </a:p>
@@ -2386,7 +2645,7 @@
             <a:fld id="{D28399EA-4EEF-44E7-8467-72E6F332764A}" type="datetimeFigureOut">
               <a:rPr lang="en-US" altLang="en-US"/>
               <a:pPr/>
-              <a:t>10/20/2014</a:t>
+              <a:t>7/22/2015</a:t>
             </a:fld>
             <a:endParaRPr lang="en-US" altLang="en-US"/>
           </a:p>
@@ -2825,7 +3084,7 @@
             <a:fld id="{77C1FB8D-E681-43D0-8CFC-72BA42EC6455}" type="datetimeFigureOut">
               <a:rPr lang="en-US" altLang="en-US"/>
               <a:pPr/>
-              <a:t>10/20/2014</a:t>
+              <a:t>7/22/2015</a:t>
             </a:fld>
             <a:endParaRPr lang="en-US" altLang="en-US"/>
           </a:p>
@@ -2960,7 +3219,7 @@
             <a:fld id="{0262FC48-F7AD-42F7-934A-6262EE273EE2}" type="datetimeFigureOut">
               <a:rPr lang="en-US" altLang="en-US"/>
               <a:pPr/>
-              <a:t>10/20/2014</a:t>
+              <a:t>7/22/2015</a:t>
             </a:fld>
             <a:endParaRPr lang="en-US" altLang="en-US"/>
           </a:p>
@@ -3072,7 +3331,7 @@
             <a:fld id="{6F245B72-FF5C-4DC3-97E4-8DACB5C871E6}" type="datetimeFigureOut">
               <a:rPr lang="en-US" altLang="en-US"/>
               <a:pPr/>
-              <a:t>10/20/2014</a:t>
+              <a:t>7/22/2015</a:t>
             </a:fld>
             <a:endParaRPr lang="en-US" altLang="en-US"/>
           </a:p>
@@ -3366,7 +3625,7 @@
             <a:fld id="{F969301F-D508-4D42-919B-6F1F390769AC}" type="datetimeFigureOut">
               <a:rPr lang="en-US" altLang="en-US"/>
               <a:pPr/>
-              <a:t>10/20/2014</a:t>
+              <a:t>7/22/2015</a:t>
             </a:fld>
             <a:endParaRPr lang="en-US" altLang="en-US"/>
           </a:p>
@@ -3639,7 +3898,7 @@
             <a:fld id="{2CFCE46F-7A4B-4AA0-9F23-F74FAD51205B}" type="datetimeFigureOut">
               <a:rPr lang="en-US" altLang="en-US"/>
               <a:pPr/>
-              <a:t>10/20/2014</a:t>
+              <a:t>7/22/2015</a:t>
             </a:fld>
             <a:endParaRPr lang="en-US" altLang="en-US"/>
           </a:p>
@@ -3921,7 +4180,7 @@
             <a:fld id="{9AFD6FA3-671F-45D7-82A6-D29321A474C9}" type="datetimeFigureOut">
               <a:rPr lang="en-US" altLang="en-US"/>
               <a:pPr/>
-              <a:t>10/20/2014</a:t>
+              <a:t>7/22/2015</a:t>
             </a:fld>
             <a:endParaRPr lang="en-US" altLang="en-US"/>
           </a:p>
@@ -4629,7 +4888,7 @@
                 <a:ea typeface="+mn-ea"/>
                 <a:cs typeface="+mn-cs"/>
               </a:rPr>
-              <a:t>October 2014</a:t>
+              <a:t>July 2015</a:t>
             </a:r>
             <a:endParaRPr lang="en-US" dirty="0">
               <a:ea typeface="+mn-ea"/>
@@ -4689,13 +4948,7 @@
               <a:rPr lang="en-US" altLang="en-US" dirty="0" smtClean="0">
                 <a:ea typeface="ＭＳ Ｐゴシック" pitchFamily="34" charset="-128"/>
               </a:rPr>
-              <a:t>Why </a:t>
-            </a:r>
-            <a:r>
-              <a:rPr lang="en-US" altLang="en-US" dirty="0" smtClean="0">
-                <a:ea typeface="ＭＳ Ｐゴシック" pitchFamily="34" charset="-128"/>
-              </a:rPr>
-              <a:t>TDS?</a:t>
+              <a:t>Why TDS?</a:t>
             </a:r>
             <a:br>
               <a:rPr lang="en-US" altLang="en-US" dirty="0" smtClean="0">
@@ -4708,9 +4961,6 @@
               </a:rPr>
               <a:t>Users</a:t>
             </a:r>
-            <a:endParaRPr lang="en-US" altLang="en-US" dirty="0" smtClean="0">
-              <a:ea typeface="ＭＳ Ｐゴシック" pitchFamily="34" charset="-128"/>
-            </a:endParaRPr>
           </a:p>
         </p:txBody>
       </p:sp>
@@ -4745,13 +4995,7 @@
               <a:rPr lang="en-US" altLang="en-US" dirty="0" smtClean="0">
                 <a:ea typeface="ＭＳ Ｐゴシック" pitchFamily="34" charset="-128"/>
               </a:rPr>
-              <a:t>As </a:t>
-            </a:r>
-            <a:r>
-              <a:rPr lang="en-US" altLang="en-US" dirty="0" smtClean="0">
-                <a:ea typeface="ＭＳ Ｐゴシック" pitchFamily="34" charset="-128"/>
-              </a:rPr>
-              <a:t>a user, some things I want to be able to do:</a:t>
+              <a:t>As a user, some things I want to be able to do:</a:t>
             </a:r>
           </a:p>
           <a:p>
@@ -5291,9 +5535,6 @@
               </a:rPr>
               <a:t>Users</a:t>
             </a:r>
-            <a:endParaRPr lang="en-US" altLang="en-US" dirty="0" smtClean="0">
-              <a:ea typeface="ＭＳ Ｐゴシック" pitchFamily="34" charset="-128"/>
-            </a:endParaRPr>
           </a:p>
         </p:txBody>
       </p:sp>
@@ -5696,9 +5937,6 @@
               </a:rPr>
               <a:t>Users</a:t>
             </a:r>
-            <a:endParaRPr lang="en-US" altLang="en-US" dirty="0" smtClean="0">
-              <a:ea typeface="ＭＳ Ｐゴシック" pitchFamily="34" charset="-128"/>
-            </a:endParaRPr>
           </a:p>
         </p:txBody>
       </p:sp>
@@ -5812,13 +6050,7 @@
               <a:rPr lang="en-US" altLang="en-US" dirty="0" smtClean="0">
                 <a:ea typeface="ＭＳ Ｐゴシック" pitchFamily="34" charset="-128"/>
               </a:rPr>
-              <a:t>Why </a:t>
-            </a:r>
-            <a:r>
-              <a:rPr lang="en-US" altLang="en-US" dirty="0" smtClean="0">
-                <a:ea typeface="ＭＳ Ｐゴシック" pitchFamily="34" charset="-128"/>
-              </a:rPr>
-              <a:t>TDS?</a:t>
+              <a:t>Why TDS?</a:t>
             </a:r>
             <a:br>
               <a:rPr lang="en-US" altLang="en-US" dirty="0" smtClean="0">
@@ -5829,13 +6061,7 @@
               <a:rPr lang="en-US" altLang="en-US" dirty="0" smtClean="0">
                 <a:ea typeface="ＭＳ Ｐゴシック" pitchFamily="34" charset="-128"/>
               </a:rPr>
-              <a:t>Data </a:t>
-            </a:r>
-            <a:r>
-              <a:rPr lang="en-US" altLang="en-US" dirty="0" smtClean="0">
-                <a:ea typeface="ＭＳ Ｐゴシック" pitchFamily="34" charset="-128"/>
-              </a:rPr>
-              <a:t>Providers</a:t>
+              <a:t>Data Providers</a:t>
             </a:r>
           </a:p>
         </p:txBody>
@@ -5871,13 +6097,7 @@
               <a:rPr lang="en-US" altLang="en-US" dirty="0" smtClean="0">
                 <a:ea typeface="ＭＳ Ｐゴシック" pitchFamily="34" charset="-128"/>
               </a:rPr>
-              <a:t>As </a:t>
-            </a:r>
-            <a:r>
-              <a:rPr lang="en-US" altLang="en-US" dirty="0" smtClean="0">
-                <a:ea typeface="ＭＳ Ｐゴシック" pitchFamily="34" charset="-128"/>
-              </a:rPr>
-              <a:t>a data provider, I want to be able to:</a:t>
+              <a:t>As a data provider, I want to be able to:</a:t>
             </a:r>
           </a:p>
           <a:p>
@@ -6143,13 +6363,7 @@
               <a:rPr lang="en-US" altLang="en-US" dirty="0" smtClean="0">
                 <a:ea typeface="ＭＳ Ｐゴシック" pitchFamily="34" charset="-128"/>
               </a:rPr>
-              <a:t>Why </a:t>
-            </a:r>
-            <a:r>
-              <a:rPr lang="en-US" altLang="en-US" dirty="0" smtClean="0">
-                <a:ea typeface="ＭＳ Ｐゴシック" pitchFamily="34" charset="-128"/>
-              </a:rPr>
-              <a:t>TDS?</a:t>
+              <a:t>Why TDS?</a:t>
             </a:r>
             <a:br>
               <a:rPr lang="en-US" altLang="en-US" dirty="0" smtClean="0">
@@ -6160,13 +6374,7 @@
               <a:rPr lang="en-US" altLang="en-US" dirty="0" smtClean="0">
                 <a:ea typeface="ＭＳ Ｐゴシック" pitchFamily="34" charset="-128"/>
               </a:rPr>
-              <a:t>Data </a:t>
-            </a:r>
-            <a:r>
-              <a:rPr lang="en-US" altLang="en-US" dirty="0" smtClean="0">
-                <a:ea typeface="ＭＳ Ｐゴシック" pitchFamily="34" charset="-128"/>
-              </a:rPr>
-              <a:t>Providers</a:t>
+              <a:t>Data Providers</a:t>
             </a:r>
           </a:p>
         </p:txBody>
@@ -6202,13 +6410,7 @@
               <a:rPr lang="en-US" altLang="en-US" dirty="0" smtClean="0">
                 <a:ea typeface="ＭＳ Ｐゴシック" pitchFamily="34" charset="-128"/>
               </a:rPr>
-              <a:t>As </a:t>
-            </a:r>
-            <a:r>
-              <a:rPr lang="en-US" altLang="en-US" dirty="0" smtClean="0">
-                <a:ea typeface="ＭＳ Ｐゴシック" pitchFamily="34" charset="-128"/>
-              </a:rPr>
-              <a:t>a data provider, I want to be able to:</a:t>
+              <a:t>As a data provider, I want to be able to:</a:t>
             </a:r>
           </a:p>
           <a:p>
@@ -6479,13 +6681,7 @@
               <a:rPr lang="en-US" altLang="en-US" dirty="0" smtClean="0">
                 <a:ea typeface="ＭＳ Ｐゴシック" pitchFamily="34" charset="-128"/>
               </a:rPr>
-              <a:t>Why </a:t>
-            </a:r>
-            <a:r>
-              <a:rPr lang="en-US" altLang="en-US" dirty="0" smtClean="0">
-                <a:ea typeface="ＭＳ Ｐゴシック" pitchFamily="34" charset="-128"/>
-              </a:rPr>
-              <a:t>TDS?</a:t>
+              <a:t>Why TDS?</a:t>
             </a:r>
             <a:br>
               <a:rPr lang="en-US" altLang="en-US" dirty="0" smtClean="0">
@@ -6496,13 +6692,7 @@
               <a:rPr lang="en-US" altLang="en-US" dirty="0" smtClean="0">
                 <a:ea typeface="ＭＳ Ｐゴシック" pitchFamily="34" charset="-128"/>
               </a:rPr>
-              <a:t>Data </a:t>
-            </a:r>
-            <a:r>
-              <a:rPr lang="en-US" altLang="en-US" dirty="0" smtClean="0">
-                <a:ea typeface="ＭＳ Ｐゴシック" pitchFamily="34" charset="-128"/>
-              </a:rPr>
-              <a:t>Providers</a:t>
+              <a:t>Data Providers</a:t>
             </a:r>
           </a:p>
         </p:txBody>
@@ -6538,13 +6728,7 @@
               <a:rPr lang="en-US" altLang="en-US" dirty="0" smtClean="0">
                 <a:ea typeface="ＭＳ Ｐゴシック" pitchFamily="34" charset="-128"/>
               </a:rPr>
-              <a:t>As </a:t>
-            </a:r>
-            <a:r>
-              <a:rPr lang="en-US" altLang="en-US" dirty="0" smtClean="0">
-                <a:ea typeface="ＭＳ Ｐゴシック" pitchFamily="34" charset="-128"/>
-              </a:rPr>
-              <a:t>a data provider, I want to be able to:</a:t>
+              <a:t>As a data provider, I want to be able to:</a:t>
             </a:r>
           </a:p>
           <a:p>
@@ -6909,19 +7093,45 @@
                 <a:ea typeface="+mn-ea"/>
                 <a:cs typeface="+mn-cs"/>
               </a:rPr>
-              <a:t>Web server for scientific data (written in 100% </a:t>
-            </a:r>
+              <a:t>Web server for scientific data (written in 100% Java*)</a:t>
+            </a:r>
+          </a:p>
+          <a:p>
+            <a:pPr>
+              <a:defRPr/>
+            </a:pPr>
             <a:r>
               <a:rPr lang="en-US" dirty="0" smtClean="0">
                 <a:ea typeface="+mn-ea"/>
                 <a:cs typeface="+mn-cs"/>
               </a:rPr>
-              <a:t>Java*)</a:t>
-            </a:r>
-            <a:endParaRPr lang="en-US" dirty="0" smtClean="0">
-              <a:ea typeface="+mn-ea"/>
-              <a:cs typeface="+mn-cs"/>
-            </a:endParaRPr>
+              <a:t>Can serve any dataset the </a:t>
+            </a:r>
+            <a:r>
+              <a:rPr lang="en-US" dirty="0" err="1" smtClean="0">
+                <a:ea typeface="+mn-ea"/>
+                <a:cs typeface="+mn-cs"/>
+              </a:rPr>
+              <a:t>netCDF</a:t>
+            </a:r>
+            <a:r>
+              <a:rPr lang="en-US" dirty="0" smtClean="0">
+                <a:ea typeface="+mn-ea"/>
+                <a:cs typeface="+mn-cs"/>
+              </a:rPr>
+              <a:t>-Java library can read</a:t>
+            </a:r>
+          </a:p>
+          <a:p>
+            <a:pPr lvl="1">
+              <a:defRPr/>
+            </a:pPr>
+            <a:r>
+              <a:rPr lang="en-US" dirty="0" smtClean="0">
+                <a:ea typeface="+mn-ea"/>
+              </a:rPr>
+              <a:t>E.g., netCDF-3, netCDF-4, HDF-4, HDF-5, HDF-EOS, GRIB-1, GRIB-2</a:t>
+            </a:r>
           </a:p>
           <a:p>
             <a:pPr>
@@ -6932,21 +7142,19 @@
                 <a:ea typeface="+mn-ea"/>
                 <a:cs typeface="+mn-cs"/>
               </a:rPr>
-              <a:t>Can serve any dataset the </a:t>
-            </a:r>
-            <a:r>
-              <a:rPr lang="en-US" dirty="0" err="1" smtClean="0">
-                <a:ea typeface="+mn-ea"/>
-                <a:cs typeface="+mn-cs"/>
-              </a:rPr>
-              <a:t>netCDF</a:t>
-            </a:r>
+              <a:t>Advertise available datasets and services via catalogs</a:t>
+            </a:r>
+          </a:p>
+          <a:p>
+            <a:pPr>
+              <a:defRPr/>
+            </a:pPr>
             <a:r>
               <a:rPr lang="en-US" dirty="0" smtClean="0">
                 <a:ea typeface="+mn-ea"/>
                 <a:cs typeface="+mn-cs"/>
               </a:rPr>
-              <a:t>-Java library can read</a:t>
+              <a:t>Data access (subset) services:</a:t>
             </a:r>
           </a:p>
           <a:p>
@@ -6954,10 +7162,35 @@
               <a:defRPr/>
             </a:pPr>
             <a:r>
+              <a:rPr lang="en-US" dirty="0" err="1" smtClean="0">
+                <a:ea typeface="+mn-ea"/>
+              </a:rPr>
+              <a:t>OPeNDAP</a:t>
+            </a:r>
+            <a:endParaRPr lang="en-US" dirty="0" smtClean="0">
+              <a:ea typeface="+mn-ea"/>
+            </a:endParaRPr>
+          </a:p>
+          <a:p>
+            <a:pPr lvl="1">
+              <a:defRPr/>
+            </a:pPr>
+            <a:r>
               <a:rPr lang="en-US" dirty="0" smtClean="0">
                 <a:ea typeface="+mn-ea"/>
               </a:rPr>
-              <a:t>E.g., netCDF-3, netCDF-4, HDF-4, HDF-5, HDF-EOS, GRIB-1, GRIB-2</a:t>
+              <a:t>OGC WMS and WCS</a:t>
+            </a:r>
+          </a:p>
+          <a:p>
+            <a:pPr lvl="1">
+              <a:defRPr/>
+            </a:pPr>
+            <a:r>
+              <a:rPr lang="en-US" dirty="0" smtClean="0">
+                <a:ea typeface="+mn-ea"/>
+              </a:rPr>
+              <a:t>NCSS</a:t>
             </a:r>
           </a:p>
           <a:p>
@@ -6969,7 +7202,29 @@
                 <a:ea typeface="+mn-ea"/>
                 <a:cs typeface="+mn-cs"/>
               </a:rPr>
-              <a:t>Advertise available datasets and services via catalogs</a:t>
+              <a:t>Data collection services</a:t>
+            </a:r>
+          </a:p>
+          <a:p>
+            <a:pPr lvl="1">
+              <a:defRPr/>
+            </a:pPr>
+            <a:r>
+              <a:rPr lang="en-US" dirty="0" smtClean="0">
+                <a:ea typeface="+mn-ea"/>
+              </a:rPr>
+              <a:t>Aggregation</a:t>
+            </a:r>
+          </a:p>
+          <a:p>
+            <a:pPr lvl="1">
+              <a:defRPr/>
+            </a:pPr>
+            <a:r>
+              <a:rPr lang="en-US" dirty="0" smtClean="0">
+                <a:ea typeface="+mn-ea"/>
+              </a:rPr>
+              <a:t>Point/station collection</a:t>
             </a:r>
           </a:p>
           <a:p>
@@ -6981,7 +7236,7 @@
                 <a:ea typeface="+mn-ea"/>
                 <a:cs typeface="+mn-cs"/>
               </a:rPr>
-              <a:t>Data access (subset) services:</a:t>
+              <a:t>Metadata services</a:t>
             </a:r>
           </a:p>
           <a:p>
@@ -6989,99 +7244,11 @@
               <a:defRPr/>
             </a:pPr>
             <a:r>
-              <a:rPr lang="en-US" dirty="0" err="1" smtClean="0">
-                <a:ea typeface="+mn-ea"/>
-              </a:rPr>
-              <a:t>OPeNDAP</a:t>
-            </a:r>
-            <a:endParaRPr lang="en-US" dirty="0" smtClean="0">
-              <a:ea typeface="+mn-ea"/>
-            </a:endParaRPr>
-          </a:p>
-          <a:p>
-            <a:pPr lvl="1">
-              <a:defRPr/>
-            </a:pPr>
-            <a:r>
               <a:rPr lang="en-US" dirty="0" smtClean="0">
                 <a:ea typeface="+mn-ea"/>
               </a:rPr>
-              <a:t>OGC WMS and WCS</a:t>
-            </a:r>
-          </a:p>
-          <a:p>
-            <a:pPr lvl="1">
-              <a:defRPr/>
-            </a:pPr>
-            <a:r>
-              <a:rPr lang="en-US" dirty="0" smtClean="0">
-                <a:ea typeface="+mn-ea"/>
-              </a:rPr>
-              <a:t>NCSS</a:t>
-            </a:r>
-          </a:p>
-          <a:p>
-            <a:pPr>
-              <a:defRPr/>
-            </a:pPr>
-            <a:r>
-              <a:rPr lang="en-US" dirty="0" smtClean="0">
-                <a:ea typeface="+mn-ea"/>
-                <a:cs typeface="+mn-cs"/>
-              </a:rPr>
-              <a:t>Data collection services</a:t>
-            </a:r>
-          </a:p>
-          <a:p>
-            <a:pPr lvl="1">
-              <a:defRPr/>
-            </a:pPr>
-            <a:r>
-              <a:rPr lang="en-US" dirty="0" smtClean="0">
-                <a:ea typeface="+mn-ea"/>
-              </a:rPr>
-              <a:t>Aggregation</a:t>
-            </a:r>
-            <a:endParaRPr lang="en-US" dirty="0" smtClean="0">
-              <a:ea typeface="+mn-ea"/>
-            </a:endParaRPr>
-          </a:p>
-          <a:p>
-            <a:pPr lvl="1">
-              <a:defRPr/>
-            </a:pPr>
-            <a:r>
-              <a:rPr lang="en-US" dirty="0" smtClean="0">
-                <a:ea typeface="+mn-ea"/>
-              </a:rPr>
-              <a:t>Point/station collection</a:t>
-            </a:r>
-          </a:p>
-          <a:p>
-            <a:pPr>
-              <a:defRPr/>
-            </a:pPr>
-            <a:r>
-              <a:rPr lang="en-US" dirty="0" smtClean="0">
-                <a:ea typeface="+mn-ea"/>
-                <a:cs typeface="+mn-cs"/>
-              </a:rPr>
-              <a:t>Metadata services</a:t>
-            </a:r>
-          </a:p>
-          <a:p>
-            <a:pPr lvl="1">
-              <a:defRPr/>
-            </a:pPr>
-            <a:r>
-              <a:rPr lang="en-US" dirty="0" smtClean="0">
-                <a:ea typeface="+mn-ea"/>
-              </a:rPr>
               <a:t>THREDDS Catalog XML</a:t>
             </a:r>
-            <a:endParaRPr lang="en-US" dirty="0" smtClean="0">
-              <a:ea typeface="+mn-ea"/>
-            </a:endParaRPr>
           </a:p>
           <a:p>
             <a:pPr lvl="1">
@@ -9885,7 +10052,7 @@
           <a:lstStyle/>
           <a:p>
             <a:r>
-              <a:rPr lang="en-US" altLang="en-US" smtClean="0">
+              <a:rPr lang="en-US" altLang="en-US" dirty="0" smtClean="0">
                 <a:ea typeface="ＭＳ Ｐゴシック" pitchFamily="34" charset="-128"/>
               </a:rPr>
               <a:t>TDS is written in 100% Java</a:t>
@@ -9893,7 +10060,7 @@
           </a:p>
           <a:p>
             <a:r>
-              <a:rPr lang="en-US" altLang="en-US" smtClean="0">
+              <a:rPr lang="en-US" altLang="en-US" dirty="0" smtClean="0">
                 <a:ea typeface="ＭＳ Ｐゴシック" pitchFamily="34" charset="-128"/>
               </a:rPr>
               <a:t>TDS uses the Java Servlet framework</a:t>
@@ -9902,7 +10069,7 @@
           <a:p>
             <a:pPr lvl="1"/>
             <a:r>
-              <a:rPr lang="en-US" altLang="en-US" smtClean="0">
+              <a:rPr lang="en-US" altLang="en-US" dirty="0" smtClean="0">
                 <a:ea typeface="ＭＳ Ｐゴシック" pitchFamily="34" charset="-128"/>
               </a:rPr>
               <a:t>Need to Install Tomcat or other servlet container</a:t>
@@ -9911,7 +10078,7 @@
           <a:p>
             <a:pPr lvl="2"/>
             <a:r>
-              <a:rPr lang="en-US" altLang="en-US" smtClean="0">
+              <a:rPr lang="en-US" altLang="en-US" dirty="0" smtClean="0">
                 <a:ea typeface="ＭＳ Ｐゴシック" pitchFamily="34" charset="-128"/>
               </a:rPr>
               <a:t>Tomcat used in many places (The Weather Channel, Netflix, LinkedIn, to name a few)</a:t>
@@ -9920,23 +10087,328 @@
           <a:p>
             <a:pPr lvl="2"/>
             <a:r>
-              <a:rPr lang="en-US" altLang="en-US" smtClean="0">
-                <a:ea typeface="ＭＳ Ｐゴシック" pitchFamily="34" charset="-128"/>
-              </a:rPr>
-              <a:t>Note: many cloud services can use servlets (e.g. Amazon Web Services, CloudBees, Google App Engine, Windows Azure Compute, etc.)</a:t>
-            </a:r>
-          </a:p>
-          <a:p>
-            <a:r>
-              <a:rPr lang="en-US" altLang="en-US" smtClean="0">
-                <a:ea typeface="ＭＳ Ｐゴシック" pitchFamily="34" charset="-128"/>
-              </a:rPr>
-              <a:t>First up: Install and configure Tomcat</a:t>
-            </a:r>
+              <a:rPr lang="en-US" altLang="en-US" dirty="0" smtClean="0">
+                <a:ea typeface="ＭＳ Ｐゴシック" pitchFamily="34" charset="-128"/>
+              </a:rPr>
+              <a:t>Note: many cloud services can use servlets (e.g. Amazon Web Services, </a:t>
+            </a:r>
+            <a:r>
+              <a:rPr lang="en-US" altLang="en-US" dirty="0" err="1" smtClean="0">
+                <a:ea typeface="ＭＳ Ｐゴシック" pitchFamily="34" charset="-128"/>
+              </a:rPr>
+              <a:t>CloudBees</a:t>
+            </a:r>
+            <a:r>
+              <a:rPr lang="en-US" altLang="en-US" dirty="0" smtClean="0">
+                <a:ea typeface="ＭＳ Ｐゴシック" pitchFamily="34" charset="-128"/>
+              </a:rPr>
+              <a:t>, Google App Engine, Windows Azure Compute, etc.)</a:t>
+            </a:r>
+          </a:p>
+          <a:p>
+            <a:r>
+              <a:rPr lang="en-US" altLang="en-US" dirty="0" smtClean="0">
+                <a:solidFill>
+                  <a:schemeClr val="bg1"/>
+                </a:solidFill>
+                <a:ea typeface="ＭＳ Ｐゴシック" pitchFamily="34" charset="-128"/>
+              </a:rPr>
+              <a:t>First up: </a:t>
+            </a:r>
+            <a:r>
+              <a:rPr lang="en-US" altLang="en-US" strike="sngStrike" dirty="0" smtClean="0">
+                <a:solidFill>
+                  <a:schemeClr val="bg1"/>
+                </a:solidFill>
+                <a:ea typeface="ＭＳ Ｐゴシック" pitchFamily="34" charset="-128"/>
+              </a:rPr>
+              <a:t>Install and configure </a:t>
+            </a:r>
+            <a:r>
+              <a:rPr lang="en-US" altLang="en-US" strike="sngStrike" dirty="0" smtClean="0">
+                <a:solidFill>
+                  <a:schemeClr val="bg1"/>
+                </a:solidFill>
+                <a:ea typeface="ＭＳ Ｐゴシック" pitchFamily="34" charset="-128"/>
+              </a:rPr>
+              <a:t>Tomcat </a:t>
+            </a:r>
+            <a:r>
+              <a:rPr lang="en-US" altLang="en-US" dirty="0" smtClean="0">
+                <a:solidFill>
+                  <a:schemeClr val="bg1"/>
+                </a:solidFill>
+                <a:ea typeface="ＭＳ Ｐゴシック" pitchFamily="34" charset="-128"/>
+              </a:rPr>
+              <a:t>Docker </a:t>
+            </a:r>
+            <a:r>
+              <a:rPr lang="en-US" altLang="en-US" dirty="0" err="1" smtClean="0">
+                <a:solidFill>
+                  <a:schemeClr val="bg1"/>
+                </a:solidFill>
+                <a:ea typeface="ＭＳ Ｐゴシック" pitchFamily="34" charset="-128"/>
+              </a:rPr>
+              <a:t>Docker</a:t>
+            </a:r>
+            <a:r>
+              <a:rPr lang="en-US" altLang="en-US" dirty="0" smtClean="0">
+                <a:solidFill>
+                  <a:schemeClr val="bg1"/>
+                </a:solidFill>
+                <a:ea typeface="ＭＳ Ｐゴシック" pitchFamily="34" charset="-128"/>
+              </a:rPr>
+              <a:t> </a:t>
+            </a:r>
+            <a:r>
+              <a:rPr lang="en-US" altLang="en-US" dirty="0" err="1" smtClean="0">
+                <a:solidFill>
+                  <a:schemeClr val="bg1"/>
+                </a:solidFill>
+                <a:ea typeface="ＭＳ Ｐゴシック" pitchFamily="34" charset="-128"/>
+              </a:rPr>
+              <a:t>Docker</a:t>
+            </a:r>
+            <a:r>
+              <a:rPr lang="en-US" altLang="en-US" dirty="0" smtClean="0">
+                <a:solidFill>
+                  <a:schemeClr val="bg1"/>
+                </a:solidFill>
+                <a:ea typeface="ＭＳ Ｐゴシック" pitchFamily="34" charset="-128"/>
+              </a:rPr>
+              <a:t> and TDS</a:t>
+            </a:r>
+            <a:endParaRPr lang="en-US" altLang="en-US" dirty="0" smtClean="0">
+              <a:solidFill>
+                <a:schemeClr val="bg1"/>
+              </a:solidFill>
+              <a:ea typeface="ＭＳ Ｐゴシック" pitchFamily="34" charset="-128"/>
+            </a:endParaRPr>
           </a:p>
         </p:txBody>
       </p:sp>
     </p:spTree>
+  </p:cSld>
+  <p:clrMapOvr>
+    <a:masterClrMapping/>
+  </p:clrMapOvr>
+  <p:timing>
+    <p:tnLst>
+      <p:par>
+        <p:cTn id="1" dur="indefinite" restart="never" nodeType="tmRoot"/>
+      </p:par>
+    </p:tnLst>
+  </p:timing>
+</p:sld>
+</file>
+
+<file path=ppt/slides/slide19.xml><?xml version="1.0" encoding="utf-8"?>
+<p:sld xmlns:a="http://schemas.openxmlformats.org/drawingml/2006/main" xmlns:r="http://schemas.openxmlformats.org/officeDocument/2006/relationships" xmlns:p="http://schemas.openxmlformats.org/presentationml/2006/main">
+  <p:cSld>
+    <p:spTree>
+      <p:nvGrpSpPr>
+        <p:cNvPr id="1" name=""/>
+        <p:cNvGrpSpPr/>
+        <p:nvPr/>
+      </p:nvGrpSpPr>
+      <p:grpSpPr>
+        <a:xfrm>
+          <a:off x="0" y="0"/>
+          <a:ext cx="0" cy="0"/>
+          <a:chOff x="0" y="0"/>
+          <a:chExt cx="0" cy="0"/>
+        </a:xfrm>
+      </p:grpSpPr>
+      <p:sp>
+        <p:nvSpPr>
+          <p:cNvPr id="38913" name="Title 1"/>
+          <p:cNvSpPr>
+            <a:spLocks noGrp="1"/>
+          </p:cNvSpPr>
+          <p:nvPr>
+            <p:ph type="title"/>
+          </p:nvPr>
+        </p:nvSpPr>
+        <p:spPr>
+          <a:xfrm>
+            <a:off x="457200" y="457200"/>
+            <a:ext cx="8229600" cy="1143000"/>
+          </a:xfrm>
+        </p:spPr>
+        <p:txBody>
+          <a:bodyPr/>
+          <a:lstStyle/>
+          <a:p>
+            <a:r>
+              <a:rPr lang="en-US" altLang="en-US" sz="4000" smtClean="0">
+                <a:ea typeface="ＭＳ Ｐゴシック" pitchFamily="34" charset="-128"/>
+              </a:rPr>
+              <a:t>THREDDS Data Server</a:t>
+            </a:r>
+            <a:br>
+              <a:rPr lang="en-US" altLang="en-US" sz="4000" smtClean="0">
+                <a:ea typeface="ＭＳ Ｐゴシック" pitchFamily="34" charset="-128"/>
+              </a:rPr>
+            </a:br>
+            <a:r>
+              <a:rPr lang="en-US" altLang="en-US" sz="4000" smtClean="0">
+                <a:ea typeface="ＭＳ Ｐゴシック" pitchFamily="34" charset="-128"/>
+              </a:rPr>
+              <a:t>Getting Started</a:t>
+            </a:r>
+          </a:p>
+        </p:txBody>
+      </p:sp>
+      <p:sp>
+        <p:nvSpPr>
+          <p:cNvPr id="38914" name="Content Placeholder 2"/>
+          <p:cNvSpPr>
+            <a:spLocks noGrp="1"/>
+          </p:cNvSpPr>
+          <p:nvPr>
+            <p:ph idx="1"/>
+          </p:nvPr>
+        </p:nvSpPr>
+        <p:spPr>
+          <a:xfrm>
+            <a:off x="457200" y="2005013"/>
+            <a:ext cx="8229600" cy="4349750"/>
+          </a:xfrm>
+        </p:spPr>
+        <p:txBody>
+          <a:bodyPr/>
+          <a:lstStyle/>
+          <a:p>
+            <a:r>
+              <a:rPr lang="en-US" altLang="en-US" dirty="0" smtClean="0">
+                <a:ea typeface="ＭＳ Ｐゴシック" pitchFamily="34" charset="-128"/>
+              </a:rPr>
+              <a:t>TDS is written in 100% Java</a:t>
+            </a:r>
+          </a:p>
+          <a:p>
+            <a:r>
+              <a:rPr lang="en-US" altLang="en-US" dirty="0" smtClean="0">
+                <a:ea typeface="ＭＳ Ｐゴシック" pitchFamily="34" charset="-128"/>
+              </a:rPr>
+              <a:t>TDS uses the Java Servlet framework</a:t>
+            </a:r>
+          </a:p>
+          <a:p>
+            <a:pPr lvl="1"/>
+            <a:r>
+              <a:rPr lang="en-US" altLang="en-US" dirty="0" smtClean="0">
+                <a:ea typeface="ＭＳ Ｐゴシック" pitchFamily="34" charset="-128"/>
+              </a:rPr>
+              <a:t>Need to Install Tomcat or other servlet container</a:t>
+            </a:r>
+          </a:p>
+          <a:p>
+            <a:pPr lvl="2"/>
+            <a:r>
+              <a:rPr lang="en-US" altLang="en-US" dirty="0" smtClean="0">
+                <a:ea typeface="ＭＳ Ｐゴシック" pitchFamily="34" charset="-128"/>
+              </a:rPr>
+              <a:t>Tomcat used in many places (The Weather Channel, Netflix, LinkedIn, to name a few)</a:t>
+            </a:r>
+          </a:p>
+          <a:p>
+            <a:pPr lvl="2"/>
+            <a:r>
+              <a:rPr lang="en-US" altLang="en-US" dirty="0" smtClean="0">
+                <a:ea typeface="ＭＳ Ｐゴシック" pitchFamily="34" charset="-128"/>
+              </a:rPr>
+              <a:t>Note: many cloud services can use servlets (e.g. Amazon Web Services, </a:t>
+            </a:r>
+            <a:r>
+              <a:rPr lang="en-US" altLang="en-US" dirty="0" err="1" smtClean="0">
+                <a:ea typeface="ＭＳ Ｐゴシック" pitchFamily="34" charset="-128"/>
+              </a:rPr>
+              <a:t>CloudBees</a:t>
+            </a:r>
+            <a:r>
+              <a:rPr lang="en-US" altLang="en-US" dirty="0" smtClean="0">
+                <a:ea typeface="ＭＳ Ｐゴシック" pitchFamily="34" charset="-128"/>
+              </a:rPr>
+              <a:t>, Google App Engine, Windows Azure Compute, etc.)</a:t>
+            </a:r>
+          </a:p>
+          <a:p>
+            <a:r>
+              <a:rPr lang="en-US" altLang="en-US" dirty="0" smtClean="0">
+                <a:ea typeface="ＭＳ Ｐゴシック" pitchFamily="34" charset="-128"/>
+              </a:rPr>
+              <a:t>First up: </a:t>
+            </a:r>
+            <a:r>
+              <a:rPr lang="en-US" altLang="en-US" strike="sngStrike" dirty="0" smtClean="0">
+                <a:solidFill>
+                  <a:schemeClr val="tx1">
+                    <a:lumMod val="50000"/>
+                    <a:lumOff val="50000"/>
+                  </a:schemeClr>
+                </a:solidFill>
+                <a:ea typeface="ＭＳ Ｐゴシック" pitchFamily="34" charset="-128"/>
+              </a:rPr>
+              <a:t>Install and configure </a:t>
+            </a:r>
+            <a:r>
+              <a:rPr lang="en-US" altLang="en-US" strike="sngStrike" dirty="0" smtClean="0">
+                <a:solidFill>
+                  <a:schemeClr val="tx1">
+                    <a:lumMod val="50000"/>
+                    <a:lumOff val="50000"/>
+                  </a:schemeClr>
+                </a:solidFill>
+                <a:ea typeface="ＭＳ Ｐゴシック" pitchFamily="34" charset="-128"/>
+              </a:rPr>
+              <a:t>Tomcat </a:t>
+            </a:r>
+            <a:r>
+              <a:rPr lang="en-US" altLang="en-US" dirty="0" smtClean="0">
+                <a:solidFill>
+                  <a:schemeClr val="bg1"/>
+                </a:solidFill>
+                <a:ea typeface="ＭＳ Ｐゴシック" pitchFamily="34" charset="-128"/>
+              </a:rPr>
+              <a:t>Docker D    </a:t>
+            </a:r>
+            <a:r>
+              <a:rPr lang="en-US" altLang="en-US" dirty="0" err="1" smtClean="0">
+                <a:solidFill>
+                  <a:schemeClr val="bg1"/>
+                </a:solidFill>
+                <a:ea typeface="ＭＳ Ｐゴシック" pitchFamily="34" charset="-128"/>
+              </a:rPr>
+              <a:t>ddddocker</a:t>
+            </a:r>
+            <a:r>
+              <a:rPr lang="en-US" altLang="en-US" dirty="0" smtClean="0">
+                <a:solidFill>
+                  <a:schemeClr val="bg1"/>
+                </a:solidFill>
+                <a:ea typeface="ＭＳ Ｐゴシック" pitchFamily="34" charset="-128"/>
+              </a:rPr>
+              <a:t> </a:t>
+            </a:r>
+            <a:r>
+              <a:rPr lang="en-US" altLang="en-US" dirty="0" smtClean="0">
+                <a:ea typeface="ＭＳ Ｐゴシック" pitchFamily="34" charset="-128"/>
+              </a:rPr>
+              <a:t>Docker and TDS</a:t>
+            </a:r>
+            <a:endParaRPr lang="en-US" altLang="en-US" dirty="0" smtClean="0">
+              <a:ea typeface="ＭＳ Ｐゴシック" pitchFamily="34" charset="-128"/>
+            </a:endParaRPr>
+          </a:p>
+        </p:txBody>
+      </p:sp>
+    </p:spTree>
+    <p:extLst>
+      <p:ext uri="{BB962C8B-B14F-4D97-AF65-F5344CB8AC3E}">
+        <p14:creationId xmlns:p14="http://schemas.microsoft.com/office/powerpoint/2010/main" val="2588507764"/>
+      </p:ext>
+    </p:extLst>
   </p:cSld>
   <p:clrMapOvr>
     <a:masterClrMapping/>
@@ -10745,24 +11217,7 @@
                 <a:ea typeface="ＭＳ Ｐゴシック" pitchFamily="1" charset="-128"/>
                 <a:cs typeface="ＭＳ Ｐゴシック" pitchFamily="1" charset="-128"/>
               </a:rPr>
-              <a:t>IDD</a:t>
-            </a:r>
-            <a:r>
-              <a:rPr kumimoji="0" lang="en-US" sz="2800" b="0" i="0" u="none" strike="noStrike" kern="1200" cap="none" spc="0" normalizeH="0" baseline="0" noProof="0" dirty="0" smtClean="0">
-                <a:ln>
-                  <a:noFill/>
-                </a:ln>
-                <a:solidFill>
-                  <a:schemeClr val="tx1"/>
-                </a:solidFill>
-                <a:effectLst/>
-                <a:uLnTx/>
-                <a:uFillTx/>
-                <a:latin typeface="Gill Sans"/>
-                <a:ea typeface="ＭＳ Ｐゴシック" pitchFamily="1" charset="-128"/>
-                <a:cs typeface="ＭＳ Ｐゴシック" pitchFamily="1" charset="-128"/>
-              </a:rPr>
-              <a:t>: Real-Time Data Distribution</a:t>
+              <a:t>IDD: Real-Time Data Distribution</a:t>
             </a:r>
             <a:endParaRPr kumimoji="0" lang="en-US" sz="2800" b="0" i="0" u="none" strike="noStrike" kern="1200" cap="none" spc="0" normalizeH="0" baseline="0" noProof="0" dirty="0">
               <a:ln>
@@ -11297,13 +11752,7 @@
               <a:rPr lang="en-US" altLang="en-US" sz="1800" dirty="0" smtClean="0">
                 <a:ea typeface="ＭＳ Ｐゴシック" pitchFamily="34" charset="-128"/>
               </a:rPr>
-              <a:t>HTTP, </a:t>
-            </a:r>
-            <a:r>
-              <a:rPr lang="en-US" altLang="en-US" sz="1800" dirty="0" smtClean="0">
-                <a:ea typeface="ＭＳ Ｐゴシック" pitchFamily="34" charset="-128"/>
-              </a:rPr>
-              <a:t>FTP</a:t>
+              <a:t>HTTP, FTP</a:t>
             </a:r>
           </a:p>
           <a:p>
@@ -11393,19 +11842,7 @@
               <a:rPr lang="en-US" altLang="ja-JP" sz="2800" dirty="0" smtClean="0">
                 <a:ea typeface="ＭＳ Ｐゴシック" pitchFamily="34" charset="-128"/>
               </a:rPr>
-              <a:t> latest </a:t>
-            </a:r>
-            <a:r>
-              <a:rPr lang="en-US" altLang="ja-JP" sz="2800" dirty="0" smtClean="0">
-                <a:ea typeface="ＭＳ Ｐゴシック" pitchFamily="34" charset="-128"/>
-              </a:rPr>
-              <a:t>30 </a:t>
-            </a:r>
-            <a:r>
-              <a:rPr lang="en-US" altLang="ja-JP" sz="2800" dirty="0" smtClean="0">
-                <a:ea typeface="ＭＳ Ｐゴシック" pitchFamily="34" charset="-128"/>
-              </a:rPr>
-              <a:t>days or so of IDD data</a:t>
+              <a:t> latest 30 days or so of IDD data</a:t>
             </a:r>
           </a:p>
         </p:txBody>

</xml_diff>